<commit_message>
nearly ready to teach this
</commit_message>
<xml_diff>
--- a/doc/slides/day4/session4/DevelopingGalaxy.pptx
+++ b/doc/slides/day4/session4/DevelopingGalaxy.pptx
@@ -5,15 +5,22 @@
     <p:sldMasterId id="2147483648" r:id="rId1"/>
   </p:sldMasterIdLst>
   <p:notesMasterIdLst>
-    <p:notesMasterId r:id="rId8"/>
+    <p:notesMasterId r:id="rId15"/>
   </p:notesMasterIdLst>
   <p:sldIdLst>
     <p:sldId id="256" r:id="rId2"/>
-    <p:sldId id="261" r:id="rId3"/>
-    <p:sldId id="257" r:id="rId4"/>
-    <p:sldId id="260" r:id="rId5"/>
-    <p:sldId id="258" r:id="rId6"/>
-    <p:sldId id="259" r:id="rId7"/>
+    <p:sldId id="264" r:id="rId3"/>
+    <p:sldId id="265" r:id="rId4"/>
+    <p:sldId id="266" r:id="rId5"/>
+    <p:sldId id="267" r:id="rId6"/>
+    <p:sldId id="268" r:id="rId7"/>
+    <p:sldId id="269" r:id="rId8"/>
+    <p:sldId id="270" r:id="rId9"/>
+    <p:sldId id="271" r:id="rId10"/>
+    <p:sldId id="260" r:id="rId11"/>
+    <p:sldId id="263" r:id="rId12"/>
+    <p:sldId id="262" r:id="rId13"/>
+    <p:sldId id="259" r:id="rId14"/>
   </p:sldIdLst>
   <p:sldSz cx="9144000" cy="6858000" type="screen4x3"/>
   <p:notesSz cx="6858000" cy="9144000"/>
@@ -198,7 +205,7 @@
             <a:fld id="{D17E9A0C-AC4A-8446-B4F3-61A8106BD360}" type="datetimeFigureOut">
               <a:rPr lang="en-US" smtClean="0"/>
               <a:pPr/>
-              <a:t>9/3/12</a:t>
+              <a:t>9/8/12</a:t>
             </a:fld>
             <a:endParaRPr lang="en-US"/>
           </a:p>
@@ -740,7 +747,7 @@
             <a:fld id="{938C3E9F-8B14-E046-81C7-6A7813BD1763}" type="datetimeFigureOut">
               <a:rPr lang="en-US" smtClean="0"/>
               <a:pPr/>
-              <a:t>9/3/12</a:t>
+              <a:t>9/8/12</a:t>
             </a:fld>
             <a:endParaRPr lang="en-US"/>
           </a:p>
@@ -907,7 +914,7 @@
             <a:fld id="{938C3E9F-8B14-E046-81C7-6A7813BD1763}" type="datetimeFigureOut">
               <a:rPr lang="en-US" smtClean="0"/>
               <a:pPr/>
-              <a:t>9/3/12</a:t>
+              <a:t>9/8/12</a:t>
             </a:fld>
             <a:endParaRPr lang="en-US"/>
           </a:p>
@@ -1084,7 +1091,7 @@
             <a:fld id="{938C3E9F-8B14-E046-81C7-6A7813BD1763}" type="datetimeFigureOut">
               <a:rPr lang="en-US" smtClean="0"/>
               <a:pPr/>
-              <a:t>9/3/12</a:t>
+              <a:t>9/8/12</a:t>
             </a:fld>
             <a:endParaRPr lang="en-US"/>
           </a:p>
@@ -1251,7 +1258,7 @@
             <a:fld id="{938C3E9F-8B14-E046-81C7-6A7813BD1763}" type="datetimeFigureOut">
               <a:rPr lang="en-US" smtClean="0"/>
               <a:pPr/>
-              <a:t>9/3/12</a:t>
+              <a:t>9/8/12</a:t>
             </a:fld>
             <a:endParaRPr lang="en-US"/>
           </a:p>
@@ -1494,7 +1501,7 @@
             <a:fld id="{938C3E9F-8B14-E046-81C7-6A7813BD1763}" type="datetimeFigureOut">
               <a:rPr lang="en-US" smtClean="0"/>
               <a:pPr/>
-              <a:t>9/3/12</a:t>
+              <a:t>9/8/12</a:t>
             </a:fld>
             <a:endParaRPr lang="en-US"/>
           </a:p>
@@ -1779,7 +1786,7 @@
             <a:fld id="{938C3E9F-8B14-E046-81C7-6A7813BD1763}" type="datetimeFigureOut">
               <a:rPr lang="en-US" smtClean="0"/>
               <a:pPr/>
-              <a:t>9/3/12</a:t>
+              <a:t>9/8/12</a:t>
             </a:fld>
             <a:endParaRPr lang="en-US"/>
           </a:p>
@@ -2198,7 +2205,7 @@
             <a:fld id="{938C3E9F-8B14-E046-81C7-6A7813BD1763}" type="datetimeFigureOut">
               <a:rPr lang="en-US" smtClean="0"/>
               <a:pPr/>
-              <a:t>9/3/12</a:t>
+              <a:t>9/8/12</a:t>
             </a:fld>
             <a:endParaRPr lang="en-US"/>
           </a:p>
@@ -2313,7 +2320,7 @@
             <a:fld id="{938C3E9F-8B14-E046-81C7-6A7813BD1763}" type="datetimeFigureOut">
               <a:rPr lang="en-US" smtClean="0"/>
               <a:pPr/>
-              <a:t>9/3/12</a:t>
+              <a:t>9/8/12</a:t>
             </a:fld>
             <a:endParaRPr lang="en-US"/>
           </a:p>
@@ -2405,7 +2412,7 @@
             <a:fld id="{938C3E9F-8B14-E046-81C7-6A7813BD1763}" type="datetimeFigureOut">
               <a:rPr lang="en-US" smtClean="0"/>
               <a:pPr/>
-              <a:t>9/3/12</a:t>
+              <a:t>9/8/12</a:t>
             </a:fld>
             <a:endParaRPr lang="en-US"/>
           </a:p>
@@ -2679,7 +2686,7 @@
             <a:fld id="{938C3E9F-8B14-E046-81C7-6A7813BD1763}" type="datetimeFigureOut">
               <a:rPr lang="en-US" smtClean="0"/>
               <a:pPr/>
-              <a:t>9/3/12</a:t>
+              <a:t>9/8/12</a:t>
             </a:fld>
             <a:endParaRPr lang="en-US"/>
           </a:p>
@@ -2929,7 +2936,7 @@
             <a:fld id="{938C3E9F-8B14-E046-81C7-6A7813BD1763}" type="datetimeFigureOut">
               <a:rPr lang="en-US" smtClean="0"/>
               <a:pPr/>
-              <a:t>9/3/12</a:t>
+              <a:t>9/8/12</a:t>
             </a:fld>
             <a:endParaRPr lang="en-US"/>
           </a:p>
@@ -3139,7 +3146,7 @@
             <a:fld id="{938C3E9F-8B14-E046-81C7-6A7813BD1763}" type="datetimeFigureOut">
               <a:rPr lang="en-US" smtClean="0"/>
               <a:pPr/>
-              <a:t>9/3/12</a:t>
+              <a:t>9/8/12</a:t>
             </a:fld>
             <a:endParaRPr lang="en-US"/>
           </a:p>
@@ -3564,6 +3571,591 @@
 </p:sld>
 </file>
 
+<file path=ppt/slides/slide10.xml><?xml version="1.0" encoding="utf-8"?>
+<p:sld xmlns:a="http://schemas.openxmlformats.org/drawingml/2006/main" xmlns:r="http://schemas.openxmlformats.org/officeDocument/2006/relationships" xmlns:mc="http://schemas.openxmlformats.org/markup-compatibility/2006" xmlns:mv="urn:schemas-microsoft-com:mac:vml" xmlns:p="http://schemas.openxmlformats.org/presentationml/2006/main" mc:Ignorable="mv" mc:PreserveAttributes="mv:*">
+  <p:cSld>
+    <p:spTree>
+      <p:nvGrpSpPr>
+        <p:cNvPr id="1" name=""/>
+        <p:cNvGrpSpPr/>
+        <p:nvPr/>
+      </p:nvGrpSpPr>
+      <p:grpSpPr>
+        <a:xfrm>
+          <a:off x="0" y="0"/>
+          <a:ext cx="0" cy="0"/>
+          <a:chOff x="0" y="0"/>
+          <a:chExt cx="0" cy="0"/>
+        </a:xfrm>
+      </p:grpSpPr>
+      <p:sp>
+        <p:nvSpPr>
+          <p:cNvPr id="2" name="Title 1"/>
+          <p:cNvSpPr>
+            <a:spLocks noGrp="1"/>
+          </p:cNvSpPr>
+          <p:nvPr>
+            <p:ph type="title"/>
+          </p:nvPr>
+        </p:nvSpPr>
+        <p:spPr/>
+        <p:txBody>
+          <a:bodyPr/>
+          <a:lstStyle/>
+          <a:p>
+            <a:r>
+              <a:rPr lang="en-US" dirty="0" smtClean="0"/>
+              <a:t>Data formats</a:t>
+            </a:r>
+            <a:endParaRPr lang="en-US" dirty="0"/>
+          </a:p>
+        </p:txBody>
+      </p:sp>
+      <p:sp>
+        <p:nvSpPr>
+          <p:cNvPr id="4" name="Content Placeholder 3"/>
+          <p:cNvSpPr>
+            <a:spLocks noGrp="1"/>
+          </p:cNvSpPr>
+          <p:nvPr>
+            <p:ph sz="half" idx="1"/>
+          </p:nvPr>
+        </p:nvSpPr>
+        <p:spPr/>
+        <p:txBody>
+          <a:bodyPr/>
+          <a:lstStyle/>
+          <a:p>
+            <a:r>
+              <a:rPr lang="en-US" dirty="0" smtClean="0"/>
+              <a:t>Galaxy supports many different file formats</a:t>
+            </a:r>
+          </a:p>
+          <a:p>
+            <a:r>
+              <a:rPr lang="en-US" dirty="0" smtClean="0"/>
+              <a:t>XML tool </a:t>
+            </a:r>
+            <a:r>
+              <a:rPr lang="en-US" dirty="0" err="1" smtClean="0"/>
+              <a:t>config</a:t>
+            </a:r>
+            <a:r>
+              <a:rPr lang="en-US" dirty="0" smtClean="0"/>
+              <a:t> file needs to specify input and output formats by standardized name</a:t>
+            </a:r>
+          </a:p>
+          <a:p>
+            <a:r>
+              <a:rPr lang="en-US" dirty="0" smtClean="0"/>
+              <a:t>Recognized names/formats are in </a:t>
+            </a:r>
+            <a:r>
+              <a:rPr lang="en-US" dirty="0" err="1" smtClean="0"/>
+              <a:t>datatypes_conf.xml</a:t>
+            </a:r>
+            <a:endParaRPr lang="en-US" dirty="0"/>
+          </a:p>
+        </p:txBody>
+      </p:sp>
+      <p:pic>
+        <p:nvPicPr>
+          <p:cNvPr id="6" name="Content Placeholder 5" descr="formats.png"/>
+          <p:cNvPicPr>
+            <a:picLocks noGrp="1" noChangeAspect="1"/>
+          </p:cNvPicPr>
+          <p:nvPr>
+            <p:ph sz="half" idx="2"/>
+          </p:nvPr>
+        </p:nvPicPr>
+        <p:blipFill>
+          <a:blip r:embed="rId2"/>
+          <a:srcRect l="1497" r="57621"/>
+          <a:stretch>
+            <a:fillRect/>
+          </a:stretch>
+        </p:blipFill>
+        <p:spPr>
+          <a:xfrm>
+            <a:off x="4528488" y="1861295"/>
+            <a:ext cx="3777312" cy="3853705"/>
+          </a:xfrm>
+          <a:ln>
+            <a:solidFill>
+              <a:schemeClr val="bg1">
+                <a:lumMod val="75000"/>
+              </a:schemeClr>
+            </a:solidFill>
+          </a:ln>
+          <a:effectLst>
+            <a:outerShdw blurRad="50800" dist="38100" dir="2700000" algn="tl" rotWithShape="0">
+              <a:srgbClr val="000000">
+                <a:alpha val="43000"/>
+              </a:srgbClr>
+            </a:outerShdw>
+          </a:effectLst>
+        </p:spPr>
+      </p:pic>
+    </p:spTree>
+  </p:cSld>
+  <p:clrMapOvr>
+    <a:masterClrMapping/>
+  </p:clrMapOvr>
+  <p:timing>
+    <p:tnLst>
+      <p:par>
+        <p:cTn id="1" dur="indefinite" restart="never" nodeType="tmRoot"/>
+      </p:par>
+    </p:tnLst>
+  </p:timing>
+</p:sld>
+</file>
+
+<file path=ppt/slides/slide11.xml><?xml version="1.0" encoding="utf-8"?>
+<p:sld xmlns:a="http://schemas.openxmlformats.org/drawingml/2006/main" xmlns:r="http://schemas.openxmlformats.org/officeDocument/2006/relationships" xmlns:mc="http://schemas.openxmlformats.org/markup-compatibility/2006" xmlns:mv="urn:schemas-microsoft-com:mac:vml" xmlns:p="http://schemas.openxmlformats.org/presentationml/2006/main" mc:Ignorable="mv" mc:PreserveAttributes="mv:*">
+  <p:cSld>
+    <p:spTree>
+      <p:nvGrpSpPr>
+        <p:cNvPr id="1" name=""/>
+        <p:cNvGrpSpPr/>
+        <p:nvPr/>
+      </p:nvGrpSpPr>
+      <p:grpSpPr>
+        <a:xfrm>
+          <a:off x="0" y="0"/>
+          <a:ext cx="0" cy="0"/>
+          <a:chOff x="0" y="0"/>
+          <a:chExt cx="0" cy="0"/>
+        </a:xfrm>
+      </p:grpSpPr>
+      <p:sp>
+        <p:nvSpPr>
+          <p:cNvPr id="2" name="Title 1"/>
+          <p:cNvSpPr>
+            <a:spLocks noGrp="1"/>
+          </p:cNvSpPr>
+          <p:nvPr>
+            <p:ph type="title"/>
+          </p:nvPr>
+        </p:nvSpPr>
+        <p:spPr/>
+        <p:txBody>
+          <a:bodyPr/>
+          <a:lstStyle/>
+          <a:p>
+            <a:r>
+              <a:rPr lang="en-US" dirty="0" smtClean="0"/>
+              <a:t>“Tool shed”</a:t>
+            </a:r>
+            <a:endParaRPr lang="en-US" dirty="0"/>
+          </a:p>
+        </p:txBody>
+      </p:sp>
+      <p:sp>
+        <p:nvSpPr>
+          <p:cNvPr id="4" name="Content Placeholder 3"/>
+          <p:cNvSpPr>
+            <a:spLocks noGrp="1"/>
+          </p:cNvSpPr>
+          <p:nvPr>
+            <p:ph sz="quarter" idx="1"/>
+          </p:nvPr>
+        </p:nvSpPr>
+        <p:spPr>
+          <a:xfrm>
+            <a:off x="5562600" y="2392195"/>
+            <a:ext cx="2895600" cy="3246605"/>
+          </a:xfrm>
+        </p:spPr>
+        <p:txBody>
+          <a:bodyPr>
+            <a:normAutofit lnSpcReduction="10000"/>
+          </a:bodyPr>
+          <a:lstStyle/>
+          <a:p>
+            <a:r>
+              <a:rPr lang="en-US" dirty="0" smtClean="0"/>
+              <a:t>Easy sharing of new tools</a:t>
+            </a:r>
+          </a:p>
+          <a:p>
+            <a:r>
+              <a:rPr lang="en-US" dirty="0" smtClean="0"/>
+              <a:t>Based on Mercurial</a:t>
+            </a:r>
+          </a:p>
+          <a:p>
+            <a:r>
+              <a:rPr lang="en-US" dirty="0" smtClean="0"/>
+              <a:t>Turns Galaxy into a modular ecosystem</a:t>
+            </a:r>
+            <a:endParaRPr lang="en-US" dirty="0"/>
+          </a:p>
+        </p:txBody>
+      </p:sp>
+      <p:pic>
+        <p:nvPicPr>
+          <p:cNvPr id="6" name="Content Placeholder 5" descr="toolshed.png"/>
+          <p:cNvPicPr>
+            <a:picLocks noGrp="1" noChangeAspect="1"/>
+          </p:cNvPicPr>
+          <p:nvPr>
+            <p:ph sz="quarter" idx="2"/>
+          </p:nvPr>
+        </p:nvPicPr>
+        <p:blipFill>
+          <a:blip r:embed="rId2"/>
+          <a:srcRect t="11903"/>
+          <a:stretch>
+            <a:fillRect/>
+          </a:stretch>
+        </p:blipFill>
+        <p:spPr>
+          <a:xfrm>
+            <a:off x="838200" y="2315995"/>
+            <a:ext cx="4523171" cy="3246605"/>
+          </a:xfrm>
+          <a:prstGeom prst="rect">
+            <a:avLst/>
+          </a:prstGeom>
+          <a:ln>
+            <a:noFill/>
+          </a:ln>
+          <a:effectLst>
+            <a:outerShdw blurRad="292100" dist="139700" dir="2700000" algn="tl" rotWithShape="0">
+              <a:srgbClr val="333333">
+                <a:alpha val="65000"/>
+              </a:srgbClr>
+            </a:outerShdw>
+          </a:effectLst>
+        </p:spPr>
+      </p:pic>
+    </p:spTree>
+  </p:cSld>
+  <p:clrMapOvr>
+    <a:masterClrMapping/>
+  </p:clrMapOvr>
+  <p:timing>
+    <p:tnLst>
+      <p:par>
+        <p:cTn id="1" dur="indefinite" restart="never" nodeType="tmRoot"/>
+      </p:par>
+    </p:tnLst>
+  </p:timing>
+</p:sld>
+</file>
+
+<file path=ppt/slides/slide12.xml><?xml version="1.0" encoding="utf-8"?>
+<p:sld xmlns:a="http://schemas.openxmlformats.org/drawingml/2006/main" xmlns:r="http://schemas.openxmlformats.org/officeDocument/2006/relationships" xmlns:mc="http://schemas.openxmlformats.org/markup-compatibility/2006" xmlns:mv="urn:schemas-microsoft-com:mac:vml" xmlns:p="http://schemas.openxmlformats.org/presentationml/2006/main" mc:Ignorable="mv" mc:PreserveAttributes="mv:*">
+  <p:cSld>
+    <p:spTree>
+      <p:nvGrpSpPr>
+        <p:cNvPr id="1" name=""/>
+        <p:cNvGrpSpPr/>
+        <p:nvPr/>
+      </p:nvGrpSpPr>
+      <p:grpSpPr>
+        <a:xfrm>
+          <a:off x="0" y="0"/>
+          <a:ext cx="0" cy="0"/>
+          <a:chOff x="0" y="0"/>
+          <a:chExt cx="0" cy="0"/>
+        </a:xfrm>
+      </p:grpSpPr>
+      <p:sp>
+        <p:nvSpPr>
+          <p:cNvPr id="2" name="Title 1"/>
+          <p:cNvSpPr>
+            <a:spLocks noGrp="1"/>
+          </p:cNvSpPr>
+          <p:nvPr>
+            <p:ph type="title"/>
+          </p:nvPr>
+        </p:nvSpPr>
+        <p:spPr/>
+        <p:txBody>
+          <a:bodyPr/>
+          <a:lstStyle/>
+          <a:p>
+            <a:r>
+              <a:rPr lang="en-US" dirty="0" smtClean="0"/>
+              <a:t>Example: </a:t>
+            </a:r>
+            <a:r>
+              <a:rPr lang="en-US" dirty="0" err="1" smtClean="0"/>
+              <a:t>phylotastic</a:t>
+            </a:r>
+            <a:r>
+              <a:rPr lang="en-US" dirty="0" smtClean="0"/>
+              <a:t> tools</a:t>
+            </a:r>
+            <a:endParaRPr lang="en-US" dirty="0"/>
+          </a:p>
+        </p:txBody>
+      </p:sp>
+      <p:sp>
+        <p:nvSpPr>
+          <p:cNvPr id="3" name="Content Placeholder 2"/>
+          <p:cNvSpPr>
+            <a:spLocks noGrp="1"/>
+          </p:cNvSpPr>
+          <p:nvPr>
+            <p:ph idx="1"/>
+          </p:nvPr>
+        </p:nvSpPr>
+        <p:spPr/>
+        <p:txBody>
+          <a:bodyPr>
+            <a:normAutofit/>
+          </a:bodyPr>
+          <a:lstStyle/>
+          <a:p>
+            <a:r>
+              <a:rPr lang="en-US" dirty="0" smtClean="0"/>
+              <a:t>Perl modules that operate on very </a:t>
+            </a:r>
+            <a:r>
+              <a:rPr lang="en-US" dirty="0" smtClean="0"/>
+              <a:t>large phylogenies</a:t>
+            </a:r>
+            <a:br>
+              <a:rPr lang="en-US" dirty="0" smtClean="0"/>
+            </a:br>
+            <a:r>
+              <a:rPr lang="en-US" dirty="0" err="1" smtClean="0">
+                <a:solidFill>
+                  <a:srgbClr val="0000FF"/>
+                </a:solidFill>
+              </a:rPr>
+              <a:t>http://search.cpan.org/dist/Bio-PhyloTastic</a:t>
+            </a:r>
+            <a:r>
+              <a:rPr lang="en-US" dirty="0" smtClean="0">
+                <a:solidFill>
+                  <a:srgbClr val="0000FF"/>
+                </a:solidFill>
+              </a:rPr>
+              <a:t>/</a:t>
+            </a:r>
+          </a:p>
+          <a:p>
+            <a:r>
+              <a:rPr lang="en-US" dirty="0" smtClean="0"/>
+              <a:t>Wrapped in a simple script whose interface is </a:t>
+            </a:r>
+            <a:r>
+              <a:rPr lang="en-US" dirty="0" smtClean="0"/>
+              <a:t>described in XML</a:t>
+            </a:r>
+            <a:br>
+              <a:rPr lang="en-US" dirty="0" smtClean="0"/>
+            </a:br>
+            <a:r>
+              <a:rPr lang="en-US" dirty="0" smtClean="0">
+                <a:solidFill>
+                  <a:srgbClr val="0000FF"/>
+                </a:solidFill>
+              </a:rPr>
+              <a:t>https://</a:t>
+            </a:r>
+            <a:r>
+              <a:rPr lang="en-US" dirty="0" err="1" smtClean="0">
+                <a:solidFill>
+                  <a:srgbClr val="0000FF"/>
+                </a:solidFill>
+              </a:rPr>
+              <a:t>github.com/phylotastic/arch</a:t>
+            </a:r>
+            <a:r>
+              <a:rPr lang="en-US" dirty="0" smtClean="0">
+                <a:solidFill>
+                  <a:srgbClr val="0000FF"/>
+                </a:solidFill>
+              </a:rPr>
+              <a:t>-</a:t>
+            </a:r>
+            <a:r>
+              <a:rPr lang="en-US" dirty="0" smtClean="0">
+                <a:solidFill>
+                  <a:srgbClr val="0000FF"/>
+                </a:solidFill>
+              </a:rPr>
+              <a:t>galaxy</a:t>
+            </a:r>
+          </a:p>
+          <a:p>
+            <a:r>
+              <a:rPr lang="en-US" dirty="0" err="1" smtClean="0"/>
+              <a:t>Screencast</a:t>
+            </a:r>
+            <a:r>
+              <a:rPr lang="en-US" dirty="0" smtClean="0"/>
+              <a:t> on deployment</a:t>
+            </a:r>
+            <a:br>
+              <a:rPr lang="en-US" dirty="0" smtClean="0"/>
+            </a:br>
+            <a:r>
+              <a:rPr lang="en-US" dirty="0" err="1" smtClean="0">
+                <a:solidFill>
+                  <a:srgbClr val="0000FF"/>
+                </a:solidFill>
+              </a:rPr>
+              <a:t>http://youtu.be/d-fDngweW-M</a:t>
+            </a:r>
+            <a:endParaRPr lang="en-US" dirty="0">
+              <a:solidFill>
+                <a:srgbClr val="0000FF"/>
+              </a:solidFill>
+            </a:endParaRPr>
+          </a:p>
+        </p:txBody>
+      </p:sp>
+    </p:spTree>
+  </p:cSld>
+  <p:clrMapOvr>
+    <a:masterClrMapping/>
+  </p:clrMapOvr>
+</p:sld>
+</file>
+
+<file path=ppt/slides/slide13.xml><?xml version="1.0" encoding="utf-8"?>
+<p:sld xmlns:a="http://schemas.openxmlformats.org/drawingml/2006/main" xmlns:r="http://schemas.openxmlformats.org/officeDocument/2006/relationships" xmlns:mc="http://schemas.openxmlformats.org/markup-compatibility/2006" xmlns:mv="urn:schemas-microsoft-com:mac:vml" xmlns:p="http://schemas.openxmlformats.org/presentationml/2006/main" mc:Ignorable="mv" mc:PreserveAttributes="mv:*">
+  <p:cSld>
+    <p:spTree>
+      <p:nvGrpSpPr>
+        <p:cNvPr id="1" name=""/>
+        <p:cNvGrpSpPr/>
+        <p:nvPr/>
+      </p:nvGrpSpPr>
+      <p:grpSpPr>
+        <a:xfrm>
+          <a:off x="0" y="0"/>
+          <a:ext cx="0" cy="0"/>
+          <a:chOff x="0" y="0"/>
+          <a:chExt cx="0" cy="0"/>
+        </a:xfrm>
+      </p:grpSpPr>
+      <p:sp>
+        <p:nvSpPr>
+          <p:cNvPr id="2" name="Title 1"/>
+          <p:cNvSpPr>
+            <a:spLocks noGrp="1"/>
+          </p:cNvSpPr>
+          <p:nvPr>
+            <p:ph type="title"/>
+          </p:nvPr>
+        </p:nvSpPr>
+        <p:spPr/>
+        <p:txBody>
+          <a:bodyPr/>
+          <a:lstStyle/>
+          <a:p>
+            <a:r>
+              <a:rPr lang="en-US" dirty="0" smtClean="0"/>
+              <a:t>Exercise: deploy a simple tool</a:t>
+            </a:r>
+            <a:endParaRPr lang="en-US" dirty="0"/>
+          </a:p>
+        </p:txBody>
+      </p:sp>
+      <p:sp>
+        <p:nvSpPr>
+          <p:cNvPr id="3" name="Content Placeholder 2"/>
+          <p:cNvSpPr>
+            <a:spLocks noGrp="1"/>
+          </p:cNvSpPr>
+          <p:nvPr>
+            <p:ph idx="1"/>
+          </p:nvPr>
+        </p:nvSpPr>
+        <p:spPr/>
+        <p:txBody>
+          <a:bodyPr/>
+          <a:lstStyle/>
+          <a:p>
+            <a:r>
+              <a:rPr lang="en-US" dirty="0" smtClean="0"/>
+              <a:t>Create a wrapper xml file for </a:t>
+            </a:r>
+            <a:r>
+              <a:rPr lang="en-US" dirty="0" err="1" smtClean="0"/>
+              <a:t>fastqvalidate.pl</a:t>
+            </a:r>
+            <a:endParaRPr lang="en-US" dirty="0" smtClean="0"/>
+          </a:p>
+          <a:p>
+            <a:r>
+              <a:rPr lang="en-US" dirty="0" smtClean="0"/>
+              <a:t>Check out Galaxy from </a:t>
+            </a:r>
+            <a:r>
+              <a:rPr lang="en-US" dirty="0" err="1" smtClean="0"/>
+              <a:t>bitbucket</a:t>
+            </a:r>
+            <a:endParaRPr lang="en-US" dirty="0" smtClean="0"/>
+          </a:p>
+          <a:p>
+            <a:r>
+              <a:rPr lang="en-US" dirty="0" smtClean="0"/>
+              <a:t>Launch it (</a:t>
+            </a:r>
+            <a:r>
+              <a:rPr lang="en-US" dirty="0" err="1" smtClean="0"/>
+              <a:t>sh</a:t>
+            </a:r>
+            <a:r>
+              <a:rPr lang="en-US" dirty="0" smtClean="0"/>
+              <a:t> </a:t>
+            </a:r>
+            <a:r>
+              <a:rPr lang="en-US" dirty="0" err="1" smtClean="0"/>
+              <a:t>run.sh</a:t>
+            </a:r>
+            <a:r>
+              <a:rPr lang="en-US" dirty="0" smtClean="0"/>
+              <a:t>)</a:t>
+            </a:r>
+          </a:p>
+          <a:p>
+            <a:r>
+              <a:rPr lang="en-US" dirty="0" smtClean="0"/>
+              <a:t>Edit </a:t>
+            </a:r>
+            <a:r>
+              <a:rPr lang="en-US" dirty="0" err="1" smtClean="0"/>
+              <a:t>tool_conf.xml</a:t>
+            </a:r>
+            <a:r>
+              <a:rPr lang="en-US" dirty="0" smtClean="0"/>
+              <a:t> to point to the wrapper xml</a:t>
+            </a:r>
+          </a:p>
+          <a:p>
+            <a:r>
+              <a:rPr lang="en-US" dirty="0" smtClean="0"/>
+              <a:t>Re-launch Galaxy</a:t>
+            </a:r>
+          </a:p>
+          <a:p>
+            <a:r>
+              <a:rPr lang="en-US" dirty="0" smtClean="0"/>
+              <a:t>Test your wrapped tool with the FASTQ example files</a:t>
+            </a:r>
+          </a:p>
+          <a:p>
+            <a:endParaRPr lang="en-US" dirty="0"/>
+          </a:p>
+        </p:txBody>
+      </p:sp>
+    </p:spTree>
+  </p:cSld>
+  <p:clrMapOvr>
+    <a:masterClrMapping/>
+  </p:clrMapOvr>
+</p:sld>
+</file>
+
 <file path=ppt/slides/slide2.xml><?xml version="1.0" encoding="utf-8"?>
 <p:sld xmlns:a="http://schemas.openxmlformats.org/drawingml/2006/main" xmlns:r="http://schemas.openxmlformats.org/officeDocument/2006/relationships" xmlns:mc="http://schemas.openxmlformats.org/markup-compatibility/2006" xmlns:mv="urn:schemas-microsoft-com:mac:vml" xmlns:p="http://schemas.openxmlformats.org/presentationml/2006/main" mc:Ignorable="mv" mc:PreserveAttributes="mv:*">
   <p:cSld>
@@ -3583,7 +4175,7 @@
       </p:grpSpPr>
       <p:sp>
         <p:nvSpPr>
-          <p:cNvPr id="2" name="Title 1"/>
+          <p:cNvPr id="6" name="Title 5"/>
           <p:cNvSpPr>
             <a:spLocks noGrp="1"/>
           </p:cNvSpPr>
@@ -3598,27 +4190,488 @@
           <a:p>
             <a:r>
               <a:rPr lang="en-US" dirty="0" smtClean="0"/>
-              <a:t>How galaxy works</a:t>
+              <a:t>Galaxy under the hood</a:t>
             </a:r>
             <a:endParaRPr lang="en-US" dirty="0"/>
           </a:p>
         </p:txBody>
       </p:sp>
-      <p:sp>
-        <p:nvSpPr>
-          <p:cNvPr id="3" name="Content Placeholder 2"/>
-          <p:cNvSpPr>
-            <a:spLocks noGrp="1"/>
-          </p:cNvSpPr>
-          <p:nvPr>
-            <p:ph idx="1"/>
-          </p:nvPr>
-        </p:nvSpPr>
-        <p:spPr/>
-        <p:txBody>
-          <a:bodyPr/>
-          <a:lstStyle/>
-          <a:p>
+      <p:grpSp>
+        <p:nvGrpSpPr>
+          <p:cNvPr id="2" name="Group 6"/>
+          <p:cNvGrpSpPr>
+            <a:grpSpLocks noChangeAspect="1"/>
+          </p:cNvGrpSpPr>
+          <p:nvPr/>
+        </p:nvGrpSpPr>
+        <p:grpSpPr>
+          <a:xfrm>
+            <a:off x="990600" y="1828800"/>
+            <a:ext cx="685800" cy="1417320"/>
+            <a:chOff x="685800" y="2819400"/>
+            <a:chExt cx="1143000" cy="2362200"/>
+          </a:xfrm>
+        </p:grpSpPr>
+        <p:sp>
+          <p:nvSpPr>
+            <p:cNvPr id="8" name="Rectangle 7"/>
+            <p:cNvSpPr/>
+            <p:nvPr/>
+          </p:nvSpPr>
+          <p:spPr>
+            <a:xfrm>
+              <a:off x="914400" y="3505200"/>
+              <a:ext cx="685800" cy="914400"/>
+            </a:xfrm>
+            <a:prstGeom prst="rect">
+              <a:avLst/>
+            </a:prstGeom>
+            <a:solidFill>
+              <a:schemeClr val="tx1"/>
+            </a:solidFill>
+            <a:ln>
+              <a:noFill/>
+            </a:ln>
+            <a:effectLst/>
+          </p:spPr>
+          <p:style>
+            <a:lnRef idx="1">
+              <a:schemeClr val="accent1"/>
+            </a:lnRef>
+            <a:fillRef idx="3">
+              <a:schemeClr val="accent1"/>
+            </a:fillRef>
+            <a:effectRef idx="2">
+              <a:schemeClr val="accent1"/>
+            </a:effectRef>
+            <a:fontRef idx="minor">
+              <a:schemeClr val="lt1"/>
+            </a:fontRef>
+          </p:style>
+          <p:txBody>
+            <a:bodyPr rtlCol="0" anchor="ctr"/>
+            <a:lstStyle/>
+            <a:p>
+              <a:pPr algn="dist"/>
+              <a:endParaRPr lang="en-US"/>
+            </a:p>
+          </p:txBody>
+        </p:sp>
+        <p:sp>
+          <p:nvSpPr>
+            <p:cNvPr id="9" name="Rectangle 8"/>
+            <p:cNvSpPr/>
+            <p:nvPr/>
+          </p:nvSpPr>
+          <p:spPr>
+            <a:xfrm>
+              <a:off x="914400" y="4191000"/>
+              <a:ext cx="304800" cy="990600"/>
+            </a:xfrm>
+            <a:prstGeom prst="rect">
+              <a:avLst/>
+            </a:prstGeom>
+            <a:solidFill>
+              <a:schemeClr val="tx1"/>
+            </a:solidFill>
+            <a:ln>
+              <a:noFill/>
+            </a:ln>
+            <a:effectLst/>
+          </p:spPr>
+          <p:style>
+            <a:lnRef idx="1">
+              <a:schemeClr val="accent1"/>
+            </a:lnRef>
+            <a:fillRef idx="3">
+              <a:schemeClr val="accent1"/>
+            </a:fillRef>
+            <a:effectRef idx="2">
+              <a:schemeClr val="accent1"/>
+            </a:effectRef>
+            <a:fontRef idx="minor">
+              <a:schemeClr val="lt1"/>
+            </a:fontRef>
+          </p:style>
+          <p:txBody>
+            <a:bodyPr rtlCol="0" anchor="ctr"/>
+            <a:lstStyle/>
+            <a:p>
+              <a:pPr algn="ctr"/>
+              <a:endParaRPr lang="en-US"/>
+            </a:p>
+          </p:txBody>
+        </p:sp>
+        <p:sp>
+          <p:nvSpPr>
+            <p:cNvPr id="10" name="Rectangle 9"/>
+            <p:cNvSpPr/>
+            <p:nvPr/>
+          </p:nvSpPr>
+          <p:spPr>
+            <a:xfrm>
+              <a:off x="1295400" y="4191000"/>
+              <a:ext cx="304800" cy="990600"/>
+            </a:xfrm>
+            <a:prstGeom prst="rect">
+              <a:avLst/>
+            </a:prstGeom>
+            <a:solidFill>
+              <a:schemeClr val="tx1"/>
+            </a:solidFill>
+            <a:ln>
+              <a:noFill/>
+            </a:ln>
+            <a:effectLst/>
+          </p:spPr>
+          <p:style>
+            <a:lnRef idx="1">
+              <a:schemeClr val="accent1"/>
+            </a:lnRef>
+            <a:fillRef idx="3">
+              <a:schemeClr val="accent1"/>
+            </a:fillRef>
+            <a:effectRef idx="2">
+              <a:schemeClr val="accent1"/>
+            </a:effectRef>
+            <a:fontRef idx="minor">
+              <a:schemeClr val="lt1"/>
+            </a:fontRef>
+          </p:style>
+          <p:txBody>
+            <a:bodyPr rtlCol="0" anchor="ctr"/>
+            <a:lstStyle/>
+            <a:p>
+              <a:pPr algn="ctr"/>
+              <a:endParaRPr lang="en-US"/>
+            </a:p>
+          </p:txBody>
+        </p:sp>
+        <p:sp>
+          <p:nvSpPr>
+            <p:cNvPr id="11" name="Oval 10"/>
+            <p:cNvSpPr/>
+            <p:nvPr/>
+          </p:nvSpPr>
+          <p:spPr>
+            <a:xfrm>
+              <a:off x="952500" y="2819400"/>
+              <a:ext cx="609600" cy="609600"/>
+            </a:xfrm>
+            <a:prstGeom prst="ellipse">
+              <a:avLst/>
+            </a:prstGeom>
+            <a:solidFill>
+              <a:schemeClr val="tx1"/>
+            </a:solidFill>
+            <a:ln>
+              <a:noFill/>
+            </a:ln>
+            <a:effectLst/>
+          </p:spPr>
+          <p:style>
+            <a:lnRef idx="1">
+              <a:schemeClr val="accent1"/>
+            </a:lnRef>
+            <a:fillRef idx="3">
+              <a:schemeClr val="accent1"/>
+            </a:fillRef>
+            <a:effectRef idx="2">
+              <a:schemeClr val="accent1"/>
+            </a:effectRef>
+            <a:fontRef idx="minor">
+              <a:schemeClr val="lt1"/>
+            </a:fontRef>
+          </p:style>
+          <p:txBody>
+            <a:bodyPr rtlCol="0" anchor="ctr"/>
+            <a:lstStyle/>
+            <a:p>
+              <a:pPr algn="dist"/>
+              <a:endParaRPr lang="en-US"/>
+            </a:p>
+          </p:txBody>
+        </p:sp>
+        <p:sp>
+          <p:nvSpPr>
+            <p:cNvPr id="12" name="Rectangle 11"/>
+            <p:cNvSpPr/>
+            <p:nvPr/>
+          </p:nvSpPr>
+          <p:spPr>
+            <a:xfrm>
+              <a:off x="1676400" y="3505200"/>
+              <a:ext cx="152400" cy="914400"/>
+            </a:xfrm>
+            <a:prstGeom prst="rect">
+              <a:avLst/>
+            </a:prstGeom>
+            <a:solidFill>
+              <a:schemeClr val="tx1"/>
+            </a:solidFill>
+            <a:ln>
+              <a:noFill/>
+            </a:ln>
+            <a:effectLst/>
+          </p:spPr>
+          <p:style>
+            <a:lnRef idx="1">
+              <a:schemeClr val="accent1"/>
+            </a:lnRef>
+            <a:fillRef idx="3">
+              <a:schemeClr val="accent1"/>
+            </a:fillRef>
+            <a:effectRef idx="2">
+              <a:schemeClr val="accent1"/>
+            </a:effectRef>
+            <a:fontRef idx="minor">
+              <a:schemeClr val="lt1"/>
+            </a:fontRef>
+          </p:style>
+          <p:txBody>
+            <a:bodyPr rtlCol="0" anchor="ctr"/>
+            <a:lstStyle/>
+            <a:p>
+              <a:pPr algn="ctr"/>
+              <a:endParaRPr lang="en-US"/>
+            </a:p>
+          </p:txBody>
+        </p:sp>
+        <p:sp>
+          <p:nvSpPr>
+            <p:cNvPr id="13" name="Rectangle 12"/>
+            <p:cNvSpPr/>
+            <p:nvPr/>
+          </p:nvSpPr>
+          <p:spPr>
+            <a:xfrm>
+              <a:off x="685800" y="3505200"/>
+              <a:ext cx="152400" cy="914400"/>
+            </a:xfrm>
+            <a:prstGeom prst="rect">
+              <a:avLst/>
+            </a:prstGeom>
+            <a:solidFill>
+              <a:schemeClr val="tx1"/>
+            </a:solidFill>
+            <a:ln>
+              <a:noFill/>
+            </a:ln>
+            <a:effectLst/>
+          </p:spPr>
+          <p:style>
+            <a:lnRef idx="1">
+              <a:schemeClr val="accent1"/>
+            </a:lnRef>
+            <a:fillRef idx="3">
+              <a:schemeClr val="accent1"/>
+            </a:fillRef>
+            <a:effectRef idx="2">
+              <a:schemeClr val="accent1"/>
+            </a:effectRef>
+            <a:fontRef idx="minor">
+              <a:schemeClr val="lt1"/>
+            </a:fontRef>
+          </p:style>
+          <p:txBody>
+            <a:bodyPr rtlCol="0" anchor="ctr"/>
+            <a:lstStyle/>
+            <a:p>
+              <a:pPr algn="ctr"/>
+              <a:endParaRPr lang="en-US"/>
+            </a:p>
+          </p:txBody>
+        </p:sp>
+      </p:grpSp>
+      <p:pic>
+        <p:nvPicPr>
+          <p:cNvPr id="14" name="Picture 13" descr="galaxyLogoTrimmed.png"/>
+          <p:cNvPicPr>
+            <a:picLocks noChangeAspect="1"/>
+          </p:cNvPicPr>
+          <p:nvPr/>
+        </p:nvPicPr>
+        <p:blipFill>
+          <a:blip r:embed="rId2"/>
+          <a:stretch>
+            <a:fillRect/>
+          </a:stretch>
+        </p:blipFill>
+        <p:spPr>
+          <a:xfrm>
+            <a:off x="4025900" y="1895156"/>
+            <a:ext cx="4432300" cy="1229044"/>
+          </a:xfrm>
+          <a:prstGeom prst="rect">
+            <a:avLst/>
+          </a:prstGeom>
+        </p:spPr>
+      </p:pic>
+      <p:sp>
+        <p:nvSpPr>
+          <p:cNvPr id="15" name="Right Arrow 14"/>
+          <p:cNvSpPr/>
+          <p:nvPr/>
+        </p:nvSpPr>
+        <p:spPr>
+          <a:xfrm>
+            <a:off x="2057400" y="2057400"/>
+            <a:ext cx="1752600" cy="1051560"/>
+          </a:xfrm>
+          <a:prstGeom prst="rightArrow">
+            <a:avLst/>
+          </a:prstGeom>
+        </p:spPr>
+        <p:style>
+          <a:lnRef idx="1">
+            <a:schemeClr val="accent1"/>
+          </a:lnRef>
+          <a:fillRef idx="3">
+            <a:schemeClr val="accent1"/>
+          </a:fillRef>
+          <a:effectRef idx="2">
+            <a:schemeClr val="accent1"/>
+          </a:effectRef>
+          <a:fontRef idx="minor">
+            <a:schemeClr val="lt1"/>
+          </a:fontRef>
+        </p:style>
+        <p:txBody>
+          <a:bodyPr rtlCol="0" anchor="ctr"/>
+          <a:lstStyle/>
+          <a:p>
+            <a:pPr algn="ctr"/>
+            <a:r>
+              <a:rPr lang="en-US" dirty="0" smtClean="0"/>
+              <a:t>Issues command</a:t>
+            </a:r>
+            <a:endParaRPr lang="en-US" dirty="0"/>
+          </a:p>
+        </p:txBody>
+      </p:sp>
+      <p:sp>
+        <p:nvSpPr>
+          <p:cNvPr id="16" name="TextBox 15"/>
+          <p:cNvSpPr txBox="1"/>
+          <p:nvPr/>
+        </p:nvSpPr>
+        <p:spPr>
+          <a:xfrm>
+            <a:off x="838200" y="3581400"/>
+            <a:ext cx="5314275" cy="2308324"/>
+          </a:xfrm>
+          <a:prstGeom prst="rect">
+            <a:avLst/>
+          </a:prstGeom>
+          <a:noFill/>
+          <a:ln>
+            <a:solidFill>
+              <a:schemeClr val="tx1"/>
+            </a:solidFill>
+          </a:ln>
+        </p:spPr>
+        <p:txBody>
+          <a:bodyPr wrap="none" rtlCol="0">
+            <a:spAutoFit/>
+          </a:bodyPr>
+          <a:lstStyle/>
+          <a:p>
+            <a:pPr marL="342900" indent="-342900">
+              <a:buFont typeface="+mj-lt"/>
+              <a:buAutoNum type="arabicPeriod"/>
+            </a:pPr>
+            <a:r>
+              <a:rPr lang="en-US" sz="2400" dirty="0" smtClean="0"/>
+              <a:t>Parses HTTP request</a:t>
+            </a:r>
+          </a:p>
+          <a:p>
+            <a:pPr marL="342900" indent="-342900">
+              <a:buFont typeface="+mj-lt"/>
+              <a:buAutoNum type="arabicPeriod"/>
+            </a:pPr>
+            <a:r>
+              <a:rPr lang="en-US" sz="2400" dirty="0" smtClean="0"/>
+              <a:t>Identifies which tool to use</a:t>
+            </a:r>
+          </a:p>
+          <a:p>
+            <a:pPr marL="342900" indent="-342900">
+              <a:buFont typeface="+mj-lt"/>
+              <a:buAutoNum type="arabicPeriod"/>
+            </a:pPr>
+            <a:r>
+              <a:rPr lang="en-US" sz="2400" dirty="0" smtClean="0"/>
+              <a:t>Reads tool description</a:t>
+            </a:r>
+          </a:p>
+          <a:p>
+            <a:pPr marL="342900" indent="-342900">
+              <a:buFont typeface="+mj-lt"/>
+              <a:buAutoNum type="arabicPeriod"/>
+            </a:pPr>
+            <a:r>
+              <a:rPr lang="en-US" sz="2400" dirty="0" smtClean="0"/>
+              <a:t>Queues tool</a:t>
+            </a:r>
+          </a:p>
+          <a:p>
+            <a:pPr marL="342900" indent="-342900">
+              <a:buFont typeface="+mj-lt"/>
+              <a:buAutoNum type="arabicPeriod"/>
+            </a:pPr>
+            <a:r>
+              <a:rPr lang="en-US" sz="2400" dirty="0" smtClean="0"/>
+              <a:t>Parses result</a:t>
+            </a:r>
+          </a:p>
+          <a:p>
+            <a:pPr marL="342900" indent="-342900">
+              <a:buFont typeface="+mj-lt"/>
+              <a:buAutoNum type="arabicPeriod"/>
+            </a:pPr>
+            <a:r>
+              <a:rPr lang="en-US" sz="2400" dirty="0" smtClean="0"/>
+              <a:t>Returns HTML representation of result</a:t>
+            </a:r>
+            <a:endParaRPr lang="en-US" sz="2400" dirty="0"/>
+          </a:p>
+        </p:txBody>
+      </p:sp>
+      <p:sp>
+        <p:nvSpPr>
+          <p:cNvPr id="17" name="Bent-Up Arrow 16"/>
+          <p:cNvSpPr/>
+          <p:nvPr/>
+        </p:nvSpPr>
+        <p:spPr>
+          <a:xfrm rot="16200000" flipH="1">
+            <a:off x="6743700" y="3619501"/>
+            <a:ext cx="1752600" cy="1676400"/>
+          </a:xfrm>
+          <a:prstGeom prst="bentUpArrow">
+            <a:avLst/>
+          </a:prstGeom>
+        </p:spPr>
+        <p:style>
+          <a:lnRef idx="1">
+            <a:schemeClr val="accent1"/>
+          </a:lnRef>
+          <a:fillRef idx="3">
+            <a:schemeClr val="accent1"/>
+          </a:fillRef>
+          <a:effectRef idx="2">
+            <a:schemeClr val="accent1"/>
+          </a:effectRef>
+          <a:fontRef idx="minor">
+            <a:schemeClr val="lt1"/>
+          </a:fontRef>
+        </p:style>
+        <p:txBody>
+          <a:bodyPr rtlCol="0" anchor="ctr"/>
+          <a:lstStyle/>
+          <a:p>
+            <a:pPr algn="ctr"/>
             <a:endParaRPr lang="en-US"/>
           </a:p>
         </p:txBody>
@@ -3628,6 +4681,13 @@
   <p:clrMapOvr>
     <a:masterClrMapping/>
   </p:clrMapOvr>
+  <p:timing>
+    <p:tnLst>
+      <p:par>
+        <p:cTn id="1" dur="indefinite" restart="never" nodeType="tmRoot"/>
+      </p:par>
+    </p:tnLst>
+  </p:timing>
 </p:sld>
 </file>
 
@@ -3665,7 +4725,7 @@
           <a:p>
             <a:r>
               <a:rPr lang="en-US" dirty="0" smtClean="0"/>
-              <a:t>XML configuration file</a:t>
+              <a:t>Web server</a:t>
             </a:r>
             <a:endParaRPr lang="en-US" dirty="0"/>
           </a:p>
@@ -3673,28 +4733,95 @@
       </p:sp>
       <p:sp>
         <p:nvSpPr>
-          <p:cNvPr id="3" name="Content Placeholder 2"/>
-          <p:cNvSpPr>
-            <a:spLocks noGrp="1"/>
-          </p:cNvSpPr>
-          <p:nvPr>
-            <p:ph idx="1"/>
-          </p:nvPr>
-        </p:nvSpPr>
-        <p:spPr/>
-        <p:txBody>
-          <a:bodyPr/>
-          <a:lstStyle/>
-          <a:p>
-            <a:endParaRPr lang="en-US"/>
-          </a:p>
-        </p:txBody>
-      </p:sp>
+          <p:cNvPr id="4" name="Content Placeholder 3"/>
+          <p:cNvSpPr>
+            <a:spLocks noGrp="1"/>
+          </p:cNvSpPr>
+          <p:nvPr>
+            <p:ph sz="quarter" idx="1"/>
+          </p:nvPr>
+        </p:nvSpPr>
+        <p:spPr>
+          <a:xfrm>
+            <a:off x="609600" y="2275367"/>
+            <a:ext cx="3886200" cy="3439633"/>
+          </a:xfrm>
+        </p:spPr>
+        <p:txBody>
+          <a:bodyPr/>
+          <a:lstStyle/>
+          <a:p>
+            <a:r>
+              <a:rPr lang="en-US" dirty="0" smtClean="0"/>
+              <a:t>Simple Galaxy installs use a built-in, python-based HTTP server</a:t>
+            </a:r>
+          </a:p>
+          <a:p>
+            <a:r>
+              <a:rPr lang="en-US" dirty="0" smtClean="0"/>
+              <a:t>More robust installs typically use the Apache </a:t>
+            </a:r>
+            <a:r>
+              <a:rPr lang="en-US" dirty="0" err="1" smtClean="0"/>
+              <a:t>httpd</a:t>
+            </a:r>
+            <a:r>
+              <a:rPr lang="en-US" dirty="0" smtClean="0"/>
+              <a:t> server</a:t>
+            </a:r>
+            <a:endParaRPr lang="en-US" dirty="0"/>
+          </a:p>
+        </p:txBody>
+      </p:sp>
+      <p:pic>
+        <p:nvPicPr>
+          <p:cNvPr id="6" name="Content Placeholder 5" descr="http_header_struct.jpg"/>
+          <p:cNvPicPr>
+            <a:picLocks noGrp="1" noChangeAspect="1"/>
+          </p:cNvPicPr>
+          <p:nvPr>
+            <p:ph sz="quarter" idx="2"/>
+          </p:nvPr>
+        </p:nvPicPr>
+        <p:blipFill>
+          <a:blip r:embed="rId2"/>
+          <a:srcRect/>
+          <a:stretch>
+            <a:fillRect/>
+          </a:stretch>
+        </p:blipFill>
+        <p:spPr>
+          <a:xfrm>
+            <a:off x="4495800" y="2401221"/>
+            <a:ext cx="3886200" cy="2780379"/>
+          </a:xfrm>
+          <a:prstGeom prst="rect">
+            <a:avLst/>
+          </a:prstGeom>
+          <a:ln>
+            <a:noFill/>
+          </a:ln>
+          <a:effectLst>
+            <a:outerShdw blurRad="292100" dist="139700" dir="2700000" algn="tl" rotWithShape="0">
+              <a:srgbClr val="333333">
+                <a:alpha val="65000"/>
+              </a:srgbClr>
+            </a:outerShdw>
+          </a:effectLst>
+        </p:spPr>
+      </p:pic>
     </p:spTree>
   </p:cSld>
   <p:clrMapOvr>
     <a:masterClrMapping/>
   </p:clrMapOvr>
+  <p:timing>
+    <p:tnLst>
+      <p:par>
+        <p:cTn id="1" dur="indefinite" restart="never" nodeType="tmRoot"/>
+      </p:par>
+    </p:tnLst>
+  </p:timing>
 </p:sld>
 </file>
 
@@ -3715,6 +4842,30 @@
           <a:chExt cx="0" cy="0"/>
         </a:xfrm>
       </p:grpSpPr>
+      <p:pic>
+        <p:nvPicPr>
+          <p:cNvPr id="6" name="Content Placeholder 5" descr="python-logo.png"/>
+          <p:cNvPicPr>
+            <a:picLocks noGrp="1" noChangeAspect="1"/>
+          </p:cNvPicPr>
+          <p:nvPr>
+            <p:ph sz="quarter" idx="2"/>
+          </p:nvPr>
+        </p:nvPicPr>
+        <p:blipFill>
+          <a:blip r:embed="rId2"/>
+          <a:srcRect/>
+          <a:stretch>
+            <a:fillRect/>
+          </a:stretch>
+        </p:blipFill>
+        <p:spPr>
+          <a:xfrm>
+            <a:off x="4343400" y="1905000"/>
+            <a:ext cx="3886200" cy="3886170"/>
+          </a:xfrm>
+        </p:spPr>
+      </p:pic>
       <p:sp>
         <p:nvSpPr>
           <p:cNvPr id="2" name="Title 1"/>
@@ -3732,7 +4883,7 @@
           <a:p>
             <a:r>
               <a:rPr lang="en-US" dirty="0" smtClean="0"/>
-              <a:t>Data formats</a:t>
+              <a:t>Code base</a:t>
             </a:r>
             <a:endParaRPr lang="en-US" dirty="0"/>
           </a:p>
@@ -3740,20 +4891,39 @@
       </p:sp>
       <p:sp>
         <p:nvSpPr>
-          <p:cNvPr id="3" name="Content Placeholder 2"/>
-          <p:cNvSpPr>
-            <a:spLocks noGrp="1"/>
-          </p:cNvSpPr>
-          <p:nvPr>
-            <p:ph idx="1"/>
-          </p:nvPr>
-        </p:nvSpPr>
-        <p:spPr/>
-        <p:txBody>
-          <a:bodyPr/>
-          <a:lstStyle/>
-          <a:p>
-            <a:endParaRPr lang="en-US"/>
+          <p:cNvPr id="4" name="Content Placeholder 3"/>
+          <p:cNvSpPr>
+            <a:spLocks noGrp="1"/>
+          </p:cNvSpPr>
+          <p:nvPr>
+            <p:ph sz="quarter" idx="1"/>
+          </p:nvPr>
+        </p:nvSpPr>
+        <p:spPr>
+          <a:xfrm>
+            <a:off x="1066800" y="2209770"/>
+            <a:ext cx="3581400" cy="3810000"/>
+          </a:xfrm>
+        </p:spPr>
+        <p:txBody>
+          <a:bodyPr/>
+          <a:lstStyle/>
+          <a:p>
+            <a:r>
+              <a:rPr lang="en-US" dirty="0" smtClean="0"/>
+              <a:t>Most of the framework and the wrapper code is written in python</a:t>
+            </a:r>
+          </a:p>
+          <a:p>
+            <a:r>
+              <a:rPr lang="en-US" dirty="0" smtClean="0"/>
+              <a:t>Some wrappers in other languages, e.g. </a:t>
+            </a:r>
+            <a:r>
+              <a:rPr lang="en-US" dirty="0" err="1" smtClean="0"/>
+              <a:t>perl</a:t>
+            </a:r>
+            <a:endParaRPr lang="en-US" dirty="0"/>
           </a:p>
         </p:txBody>
       </p:sp>
@@ -3762,6 +4932,13 @@
   <p:clrMapOvr>
     <a:masterClrMapping/>
   </p:clrMapOvr>
+  <p:timing>
+    <p:tnLst>
+      <p:par>
+        <p:cTn id="1" dur="indefinite" restart="never" nodeType="tmRoot"/>
+      </p:par>
+    </p:tnLst>
+  </p:timing>
 </p:sld>
 </file>
 
@@ -3799,7 +4976,7 @@
           <a:p>
             <a:r>
               <a:rPr lang="en-US" dirty="0" smtClean="0"/>
-              <a:t>Sharing your tool</a:t>
+              <a:t>Interface language</a:t>
             </a:r>
             <a:endParaRPr lang="en-US" dirty="0"/>
           </a:p>
@@ -3807,28 +4984,75 @@
       </p:sp>
       <p:sp>
         <p:nvSpPr>
-          <p:cNvPr id="3" name="Content Placeholder 2"/>
-          <p:cNvSpPr>
-            <a:spLocks noGrp="1"/>
-          </p:cNvSpPr>
-          <p:nvPr>
-            <p:ph idx="1"/>
-          </p:nvPr>
-        </p:nvSpPr>
-        <p:spPr/>
-        <p:txBody>
-          <a:bodyPr/>
-          <a:lstStyle/>
-          <a:p>
-            <a:endParaRPr lang="en-US"/>
-          </a:p>
-        </p:txBody>
-      </p:sp>
+          <p:cNvPr id="4" name="Content Placeholder 3"/>
+          <p:cNvSpPr>
+            <a:spLocks noGrp="1"/>
+          </p:cNvSpPr>
+          <p:nvPr>
+            <p:ph sz="quarter" idx="1"/>
+          </p:nvPr>
+        </p:nvSpPr>
+        <p:spPr>
+          <a:xfrm>
+            <a:off x="612648" y="2057400"/>
+            <a:ext cx="8153400" cy="2209800"/>
+          </a:xfrm>
+        </p:spPr>
+        <p:txBody>
+          <a:bodyPr/>
+          <a:lstStyle/>
+          <a:p>
+            <a:r>
+              <a:rPr lang="en-US" dirty="0" smtClean="0"/>
+              <a:t>Under the hood, Galaxy executes command-line programs and scripts</a:t>
+            </a:r>
+          </a:p>
+          <a:p>
+            <a:r>
+              <a:rPr lang="en-US" dirty="0" smtClean="0"/>
+              <a:t>Their interfaces and tool tips are described in XML files</a:t>
+            </a:r>
+            <a:endParaRPr lang="en-US" dirty="0"/>
+          </a:p>
+        </p:txBody>
+      </p:sp>
+      <p:pic>
+        <p:nvPicPr>
+          <p:cNvPr id="6" name="Picture 5" descr="xmlLogo.png"/>
+          <p:cNvPicPr>
+            <a:picLocks noChangeAspect="1"/>
+          </p:cNvPicPr>
+          <p:nvPr/>
+        </p:nvPicPr>
+        <p:blipFill>
+          <a:blip r:embed="rId2"/>
+          <a:srcRect t="33048" b="35408"/>
+          <a:stretch>
+            <a:fillRect/>
+          </a:stretch>
+        </p:blipFill>
+        <p:spPr>
+          <a:xfrm>
+            <a:off x="457200" y="4236442"/>
+            <a:ext cx="8214631" cy="1554758"/>
+          </a:xfrm>
+          <a:prstGeom prst="rect">
+            <a:avLst/>
+          </a:prstGeom>
+        </p:spPr>
+      </p:pic>
     </p:spTree>
   </p:cSld>
   <p:clrMapOvr>
     <a:masterClrMapping/>
   </p:clrMapOvr>
+  <p:timing>
+    <p:tnLst>
+      <p:par>
+        <p:cTn id="1" dur="indefinite" restart="never" nodeType="tmRoot"/>
+      </p:par>
+    </p:tnLst>
+  </p:timing>
 </p:sld>
 </file>
 
@@ -3866,7 +5090,7 @@
           <a:p>
             <a:r>
               <a:rPr lang="en-US" dirty="0" smtClean="0"/>
-              <a:t>Exercise: deploy a simple tool</a:t>
+              <a:t>Queuing </a:t>
             </a:r>
             <a:endParaRPr lang="en-US" dirty="0"/>
           </a:p>
@@ -3874,28 +5098,442 @@
       </p:sp>
       <p:sp>
         <p:nvSpPr>
-          <p:cNvPr id="3" name="Content Placeholder 2"/>
-          <p:cNvSpPr>
-            <a:spLocks noGrp="1"/>
-          </p:cNvSpPr>
-          <p:nvPr>
-            <p:ph idx="1"/>
-          </p:nvPr>
-        </p:nvSpPr>
-        <p:spPr/>
-        <p:txBody>
-          <a:bodyPr/>
-          <a:lstStyle/>
-          <a:p>
-            <a:endParaRPr lang="en-US"/>
-          </a:p>
-        </p:txBody>
-      </p:sp>
+          <p:cNvPr id="4" name="Content Placeholder 3"/>
+          <p:cNvSpPr>
+            <a:spLocks noGrp="1"/>
+          </p:cNvSpPr>
+          <p:nvPr>
+            <p:ph sz="quarter" idx="1"/>
+          </p:nvPr>
+        </p:nvSpPr>
+        <p:spPr>
+          <a:xfrm>
+            <a:off x="4953000" y="1905000"/>
+            <a:ext cx="3502152" cy="4495800"/>
+          </a:xfrm>
+        </p:spPr>
+        <p:txBody>
+          <a:bodyPr>
+            <a:normAutofit fontScale="92500" lnSpcReduction="10000"/>
+          </a:bodyPr>
+          <a:lstStyle/>
+          <a:p>
+            <a:r>
+              <a:rPr lang="en-US" dirty="0" smtClean="0"/>
+              <a:t>Jobs are executed asynchronously</a:t>
+            </a:r>
+          </a:p>
+          <a:p>
+            <a:r>
+              <a:rPr lang="en-US" dirty="0" smtClean="0"/>
+              <a:t>Progress is shown in the data browser</a:t>
+            </a:r>
+          </a:p>
+          <a:p>
+            <a:r>
+              <a:rPr lang="en-US" dirty="0" smtClean="0"/>
+              <a:t>On big servers (e.g. “Main”), queuing is managed by the dedicated “Torque” system</a:t>
+            </a:r>
+            <a:endParaRPr lang="en-US" dirty="0"/>
+          </a:p>
+        </p:txBody>
+      </p:sp>
+      <p:pic>
+        <p:nvPicPr>
+          <p:cNvPr id="5" name="Picture 3" descr="Picture 11"/>
+          <p:cNvPicPr>
+            <a:picLocks noChangeAspect="1" noChangeArrowheads="1"/>
+          </p:cNvPicPr>
+          <p:nvPr/>
+        </p:nvPicPr>
+        <p:blipFill>
+          <a:blip r:embed="rId2"/>
+          <a:srcRect l="8240" r="29871" b="10691"/>
+          <a:stretch>
+            <a:fillRect/>
+          </a:stretch>
+        </p:blipFill>
+        <p:spPr bwMode="auto">
+          <a:xfrm>
+            <a:off x="457200" y="1905000"/>
+            <a:ext cx="4549889" cy="4427730"/>
+          </a:xfrm>
+          <a:prstGeom prst="rect">
+            <a:avLst/>
+          </a:prstGeom>
+          <a:noFill/>
+        </p:spPr>
+      </p:pic>
     </p:spTree>
   </p:cSld>
   <p:clrMapOvr>
     <a:masterClrMapping/>
   </p:clrMapOvr>
+  <p:timing>
+    <p:tnLst>
+      <p:par>
+        <p:cTn id="1" dur="indefinite" restart="never" nodeType="tmRoot"/>
+      </p:par>
+    </p:tnLst>
+  </p:timing>
+</p:sld>
+</file>
+
+<file path=ppt/slides/slide7.xml><?xml version="1.0" encoding="utf-8"?>
+<p:sld xmlns:a="http://schemas.openxmlformats.org/drawingml/2006/main" xmlns:r="http://schemas.openxmlformats.org/officeDocument/2006/relationships" xmlns:mc="http://schemas.openxmlformats.org/markup-compatibility/2006" xmlns:mv="urn:schemas-microsoft-com:mac:vml" xmlns:p="http://schemas.openxmlformats.org/presentationml/2006/main" mc:Ignorable="mv" mc:PreserveAttributes="mv:*">
+  <p:cSld>
+    <p:spTree>
+      <p:nvGrpSpPr>
+        <p:cNvPr id="1" name=""/>
+        <p:cNvGrpSpPr/>
+        <p:nvPr/>
+      </p:nvGrpSpPr>
+      <p:grpSpPr>
+        <a:xfrm>
+          <a:off x="0" y="0"/>
+          <a:ext cx="0" cy="0"/>
+          <a:chOff x="0" y="0"/>
+          <a:chExt cx="0" cy="0"/>
+        </a:xfrm>
+      </p:grpSpPr>
+      <p:sp>
+        <p:nvSpPr>
+          <p:cNvPr id="4" name="Title 3"/>
+          <p:cNvSpPr>
+            <a:spLocks noGrp="1"/>
+          </p:cNvSpPr>
+          <p:nvPr>
+            <p:ph type="title"/>
+          </p:nvPr>
+        </p:nvSpPr>
+        <p:spPr/>
+        <p:txBody>
+          <a:bodyPr/>
+          <a:lstStyle/>
+          <a:p>
+            <a:r>
+              <a:rPr lang="en-US" dirty="0" smtClean="0"/>
+              <a:t>UNIX</a:t>
+            </a:r>
+            <a:endParaRPr lang="en-US" dirty="0"/>
+          </a:p>
+        </p:txBody>
+      </p:sp>
+      <p:sp>
+        <p:nvSpPr>
+          <p:cNvPr id="6" name="Content Placeholder 5"/>
+          <p:cNvSpPr>
+            <a:spLocks noGrp="1"/>
+          </p:cNvSpPr>
+          <p:nvPr>
+            <p:ph sz="quarter" idx="1"/>
+          </p:nvPr>
+        </p:nvSpPr>
+        <p:spPr>
+          <a:xfrm>
+            <a:off x="685800" y="1943115"/>
+            <a:ext cx="3886200" cy="3973033"/>
+          </a:xfrm>
+        </p:spPr>
+        <p:txBody>
+          <a:bodyPr>
+            <a:normAutofit lnSpcReduction="10000"/>
+          </a:bodyPr>
+          <a:lstStyle/>
+          <a:p>
+            <a:r>
+              <a:rPr lang="en-US" dirty="0" smtClean="0"/>
+              <a:t>Galaxy (</a:t>
+            </a:r>
+            <a:r>
+              <a:rPr lang="en-US" dirty="0" err="1" smtClean="0"/>
+              <a:t>simply)executes</a:t>
+            </a:r>
+            <a:r>
+              <a:rPr lang="en-US" dirty="0" smtClean="0"/>
+              <a:t> command-line programs within a UNIX-like environment</a:t>
+            </a:r>
+          </a:p>
+          <a:p>
+            <a:r>
+              <a:rPr lang="en-US" dirty="0" smtClean="0"/>
+              <a:t>Galaxy doesn’t have to “know” how to run those programs, it finds out from their descriptions at runtime</a:t>
+            </a:r>
+            <a:endParaRPr lang="en-US" dirty="0"/>
+          </a:p>
+        </p:txBody>
+      </p:sp>
+      <p:pic>
+        <p:nvPicPr>
+          <p:cNvPr id="5" name="Content Placeholder 4" descr="unix_architecture.jpg"/>
+          <p:cNvPicPr>
+            <a:picLocks noGrp="1" noChangeAspect="1"/>
+          </p:cNvPicPr>
+          <p:nvPr>
+            <p:ph sz="quarter" idx="2"/>
+          </p:nvPr>
+        </p:nvPicPr>
+        <p:blipFill>
+          <a:blip r:embed="rId2"/>
+          <a:srcRect/>
+          <a:stretch>
+            <a:fillRect/>
+          </a:stretch>
+        </p:blipFill>
+        <p:spPr>
+          <a:xfrm>
+            <a:off x="4572000" y="2057430"/>
+            <a:ext cx="3886200" cy="3886170"/>
+          </a:xfrm>
+        </p:spPr>
+      </p:pic>
+    </p:spTree>
+  </p:cSld>
+  <p:clrMapOvr>
+    <a:masterClrMapping/>
+  </p:clrMapOvr>
+  <p:timing>
+    <p:tnLst>
+      <p:par>
+        <p:cTn id="1" dur="indefinite" restart="never" nodeType="tmRoot"/>
+      </p:par>
+    </p:tnLst>
+  </p:timing>
+</p:sld>
+</file>
+
+<file path=ppt/slides/slide8.xml><?xml version="1.0" encoding="utf-8"?>
+<p:sld xmlns:a="http://schemas.openxmlformats.org/drawingml/2006/main" xmlns:r="http://schemas.openxmlformats.org/officeDocument/2006/relationships" xmlns:mc="http://schemas.openxmlformats.org/markup-compatibility/2006" xmlns:mv="urn:schemas-microsoft-com:mac:vml" xmlns:p="http://schemas.openxmlformats.org/presentationml/2006/main" mc:Ignorable="mv" mc:PreserveAttributes="mv:*">
+  <p:cSld>
+    <p:spTree>
+      <p:nvGrpSpPr>
+        <p:cNvPr id="1" name=""/>
+        <p:cNvGrpSpPr/>
+        <p:nvPr/>
+      </p:nvGrpSpPr>
+      <p:grpSpPr>
+        <a:xfrm>
+          <a:off x="0" y="0"/>
+          <a:ext cx="0" cy="0"/>
+          <a:chOff x="0" y="0"/>
+          <a:chExt cx="0" cy="0"/>
+        </a:xfrm>
+      </p:grpSpPr>
+      <p:sp>
+        <p:nvSpPr>
+          <p:cNvPr id="2" name="Title 1"/>
+          <p:cNvSpPr>
+            <a:spLocks noGrp="1"/>
+          </p:cNvSpPr>
+          <p:nvPr>
+            <p:ph type="title"/>
+          </p:nvPr>
+        </p:nvSpPr>
+        <p:spPr/>
+        <p:txBody>
+          <a:bodyPr/>
+          <a:lstStyle/>
+          <a:p>
+            <a:r>
+              <a:rPr lang="en-US" dirty="0" smtClean="0"/>
+              <a:t>Database</a:t>
+            </a:r>
+            <a:endParaRPr lang="en-US" dirty="0"/>
+          </a:p>
+        </p:txBody>
+      </p:sp>
+      <p:sp>
+        <p:nvSpPr>
+          <p:cNvPr id="4" name="Content Placeholder 3"/>
+          <p:cNvSpPr>
+            <a:spLocks noGrp="1"/>
+          </p:cNvSpPr>
+          <p:nvPr>
+            <p:ph sz="quarter" idx="1"/>
+          </p:nvPr>
+        </p:nvSpPr>
+        <p:spPr>
+          <a:xfrm>
+            <a:off x="1067514" y="2427767"/>
+            <a:ext cx="3886200" cy="3287233"/>
+          </a:xfrm>
+        </p:spPr>
+        <p:txBody>
+          <a:bodyPr/>
+          <a:lstStyle/>
+          <a:p>
+            <a:r>
+              <a:rPr lang="en-US" dirty="0" smtClean="0"/>
+              <a:t>Analysis metadata is stored in a database, by default this is </a:t>
+            </a:r>
+            <a:r>
+              <a:rPr lang="en-US" dirty="0" err="1" smtClean="0"/>
+              <a:t>SQLite</a:t>
+            </a:r>
+            <a:endParaRPr lang="en-US" dirty="0" smtClean="0"/>
+          </a:p>
+          <a:p>
+            <a:r>
+              <a:rPr lang="en-US" dirty="0" smtClean="0"/>
+              <a:t>More robust installs use </a:t>
+            </a:r>
+            <a:r>
+              <a:rPr lang="en-US" dirty="0" err="1" smtClean="0"/>
+              <a:t>PostgreSQL</a:t>
+            </a:r>
+            <a:endParaRPr lang="en-US" dirty="0"/>
+          </a:p>
+        </p:txBody>
+      </p:sp>
+      <p:pic>
+        <p:nvPicPr>
+          <p:cNvPr id="6" name="Content Placeholder 5" descr="silver-database-icon.jpg"/>
+          <p:cNvPicPr>
+            <a:picLocks noGrp="1" noChangeAspect="1"/>
+          </p:cNvPicPr>
+          <p:nvPr>
+            <p:ph sz="quarter" idx="2"/>
+          </p:nvPr>
+        </p:nvPicPr>
+        <p:blipFill>
+          <a:blip r:embed="rId2"/>
+          <a:srcRect l="13841" t="4844" r="13841" b="5536"/>
+          <a:stretch>
+            <a:fillRect/>
+          </a:stretch>
+        </p:blipFill>
+        <p:spPr>
+          <a:xfrm>
+            <a:off x="5080109" y="2427767"/>
+            <a:ext cx="2844691" cy="2820155"/>
+          </a:xfrm>
+        </p:spPr>
+      </p:pic>
+    </p:spTree>
+  </p:cSld>
+  <p:clrMapOvr>
+    <a:masterClrMapping/>
+  </p:clrMapOvr>
+  <p:timing>
+    <p:tnLst>
+      <p:par>
+        <p:cTn id="1" dur="indefinite" restart="never" nodeType="tmRoot"/>
+      </p:par>
+    </p:tnLst>
+  </p:timing>
+</p:sld>
+</file>
+
+<file path=ppt/slides/slide9.xml><?xml version="1.0" encoding="utf-8"?>
+<p:sld xmlns:a="http://schemas.openxmlformats.org/drawingml/2006/main" xmlns:r="http://schemas.openxmlformats.org/officeDocument/2006/relationships" xmlns:mc="http://schemas.openxmlformats.org/markup-compatibility/2006" xmlns:mv="urn:schemas-microsoft-com:mac:vml" xmlns:p="http://schemas.openxmlformats.org/presentationml/2006/main" mc:Ignorable="mv" mc:PreserveAttributes="mv:*">
+  <p:cSld>
+    <p:spTree>
+      <p:nvGrpSpPr>
+        <p:cNvPr id="1" name=""/>
+        <p:cNvGrpSpPr/>
+        <p:nvPr/>
+      </p:nvGrpSpPr>
+      <p:grpSpPr>
+        <a:xfrm>
+          <a:off x="0" y="0"/>
+          <a:ext cx="0" cy="0"/>
+          <a:chOff x="0" y="0"/>
+          <a:chExt cx="0" cy="0"/>
+        </a:xfrm>
+      </p:grpSpPr>
+      <p:sp>
+        <p:nvSpPr>
+          <p:cNvPr id="2" name="Title 1"/>
+          <p:cNvSpPr>
+            <a:spLocks noGrp="1"/>
+          </p:cNvSpPr>
+          <p:nvPr>
+            <p:ph type="title"/>
+          </p:nvPr>
+        </p:nvSpPr>
+        <p:spPr/>
+        <p:txBody>
+          <a:bodyPr/>
+          <a:lstStyle/>
+          <a:p>
+            <a:r>
+              <a:rPr lang="en-US" dirty="0" smtClean="0"/>
+              <a:t>Configuration</a:t>
+            </a:r>
+            <a:endParaRPr lang="en-US" dirty="0"/>
+          </a:p>
+        </p:txBody>
+      </p:sp>
+      <p:sp>
+        <p:nvSpPr>
+          <p:cNvPr id="4" name="Content Placeholder 3"/>
+          <p:cNvSpPr>
+            <a:spLocks noGrp="1"/>
+          </p:cNvSpPr>
+          <p:nvPr>
+            <p:ph sz="quarter" idx="1"/>
+          </p:nvPr>
+        </p:nvSpPr>
+        <p:spPr>
+          <a:xfrm>
+            <a:off x="838200" y="2351567"/>
+            <a:ext cx="3886200" cy="3058633"/>
+          </a:xfrm>
+        </p:spPr>
+        <p:txBody>
+          <a:bodyPr/>
+          <a:lstStyle/>
+          <a:p>
+            <a:r>
+              <a:rPr lang="en-US" dirty="0" smtClean="0"/>
+              <a:t>Galaxy has many moving parts that can be configured</a:t>
+            </a:r>
+          </a:p>
+          <a:p>
+            <a:r>
+              <a:rPr lang="en-US" dirty="0" smtClean="0"/>
+              <a:t>Configuration is done using simple text-based INI files</a:t>
+            </a:r>
+            <a:endParaRPr lang="en-US" dirty="0"/>
+          </a:p>
+        </p:txBody>
+      </p:sp>
+      <p:pic>
+        <p:nvPicPr>
+          <p:cNvPr id="6" name="Content Placeholder 5" descr="INI.png"/>
+          <p:cNvPicPr>
+            <a:picLocks noGrp="1" noChangeAspect="1"/>
+          </p:cNvPicPr>
+          <p:nvPr>
+            <p:ph sz="quarter" idx="2"/>
+          </p:nvPr>
+        </p:nvPicPr>
+        <p:blipFill>
+          <a:blip r:embed="rId2"/>
+          <a:srcRect t="4152"/>
+          <a:stretch>
+            <a:fillRect/>
+          </a:stretch>
+        </p:blipFill>
+        <p:spPr>
+          <a:xfrm>
+            <a:off x="4572000" y="2246258"/>
+            <a:ext cx="3460049" cy="3316342"/>
+          </a:xfrm>
+        </p:spPr>
+      </p:pic>
+    </p:spTree>
+  </p:cSld>
+  <p:clrMapOvr>
+    <a:masterClrMapping/>
+  </p:clrMapOvr>
+  <p:timing>
+    <p:tnLst>
+      <p:par>
+        <p:cTn id="1" dur="indefinite" restart="never" nodeType="tmRoot"/>
+      </p:par>
+    </p:tnLst>
+  </p:timing>
 </p:sld>
 </file>
 

</xml_diff>